<commit_message>
uloha 1, uloha 2
</commit_message>
<xml_diff>
--- a/10-cvicenie/cvicenie10.pptx
+++ b/10-cvicenie/cvicenie10.pptx
@@ -116,6 +116,35 @@
 </p:presentation>
 </file>
 
+<file path=ppt/changesInfos/changesInfo1.xml><?xml version="1.0" encoding="utf-8"?>
+<pc:chgInfo xmlns:a="http://schemas.openxmlformats.org/drawingml/2006/main" xmlns:r="http://schemas.openxmlformats.org/officeDocument/2006/relationships" xmlns:ac="http://schemas.microsoft.com/office/drawing/2013/main/command" xmlns:pc="http://schemas.microsoft.com/office/powerpoint/2013/main/command">
+  <pc:docChgLst>
+    <pc:chgData name="Filip Láštic" userId="ce096dab-31a5-4e6e-9276-1d26ba892509" providerId="ADAL" clId="{361459A0-6BEC-4EC6-ABB7-DF1AAFC7F58C}"/>
+    <pc:docChg chg="modSld">
+      <pc:chgData name="Filip Láštic" userId="ce096dab-31a5-4e6e-9276-1d26ba892509" providerId="ADAL" clId="{361459A0-6BEC-4EC6-ABB7-DF1AAFC7F58C}" dt="2019-11-25T15:09:58.983" v="1" actId="20577"/>
+      <pc:docMkLst>
+        <pc:docMk/>
+      </pc:docMkLst>
+      <pc:sldChg chg="modSp">
+        <pc:chgData name="Filip Láštic" userId="ce096dab-31a5-4e6e-9276-1d26ba892509" providerId="ADAL" clId="{361459A0-6BEC-4EC6-ABB7-DF1AAFC7F58C}" dt="2019-11-25T15:09:58.983" v="1" actId="20577"/>
+        <pc:sldMkLst>
+          <pc:docMk/>
+          <pc:sldMk cId="53202038" sldId="261"/>
+        </pc:sldMkLst>
+        <pc:spChg chg="mod">
+          <ac:chgData name="Filip Láštic" userId="ce096dab-31a5-4e6e-9276-1d26ba892509" providerId="ADAL" clId="{361459A0-6BEC-4EC6-ABB7-DF1AAFC7F58C}" dt="2019-11-25T15:09:58.983" v="1" actId="20577"/>
+          <ac:spMkLst>
+            <pc:docMk/>
+            <pc:sldMk cId="53202038" sldId="261"/>
+            <ac:spMk id="2" creationId="{68D1E766-A2D7-7642-BB5D-48A719EA9A75}"/>
+          </ac:spMkLst>
+        </pc:spChg>
+      </pc:sldChg>
+    </pc:docChg>
+  </pc:docChgLst>
+</pc:chgInfo>
+</file>
+
 <file path=ppt/slideLayouts/slideLayout1.xml><?xml version="1.0" encoding="utf-8"?>
 <p:sldLayout xmlns:a="http://schemas.openxmlformats.org/drawingml/2006/main" xmlns:r="http://schemas.openxmlformats.org/officeDocument/2006/relationships" xmlns:p="http://schemas.openxmlformats.org/presentationml/2006/main" type="title" preserve="1">
   <p:cSld name="Title Slide">
@@ -263,7 +292,7 @@
           <a:p>
             <a:fld id="{9D2349FF-49C3-5F4A-AB03-4F06B5BF3E1A}" type="datetimeFigureOut">
               <a:rPr lang="en-US" smtClean="0"/>
-              <a:t>11/25/19</a:t>
+              <a:t>11/25/2019</a:t>
             </a:fld>
             <a:endParaRPr lang="en-US"/>
           </a:p>
@@ -461,7 +490,7 @@
           <a:p>
             <a:fld id="{9D2349FF-49C3-5F4A-AB03-4F06B5BF3E1A}" type="datetimeFigureOut">
               <a:rPr lang="en-US" smtClean="0"/>
-              <a:t>11/25/19</a:t>
+              <a:t>11/25/2019</a:t>
             </a:fld>
             <a:endParaRPr lang="en-US"/>
           </a:p>
@@ -669,7 +698,7 @@
           <a:p>
             <a:fld id="{9D2349FF-49C3-5F4A-AB03-4F06B5BF3E1A}" type="datetimeFigureOut">
               <a:rPr lang="en-US" smtClean="0"/>
-              <a:t>11/25/19</a:t>
+              <a:t>11/25/2019</a:t>
             </a:fld>
             <a:endParaRPr lang="en-US"/>
           </a:p>
@@ -867,7 +896,7 @@
           <a:p>
             <a:fld id="{9D2349FF-49C3-5F4A-AB03-4F06B5BF3E1A}" type="datetimeFigureOut">
               <a:rPr lang="en-US" smtClean="0"/>
-              <a:t>11/25/19</a:t>
+              <a:t>11/25/2019</a:t>
             </a:fld>
             <a:endParaRPr lang="en-US"/>
           </a:p>
@@ -1142,7 +1171,7 @@
           <a:p>
             <a:fld id="{9D2349FF-49C3-5F4A-AB03-4F06B5BF3E1A}" type="datetimeFigureOut">
               <a:rPr lang="en-US" smtClean="0"/>
-              <a:t>11/25/19</a:t>
+              <a:t>11/25/2019</a:t>
             </a:fld>
             <a:endParaRPr lang="en-US"/>
           </a:p>
@@ -1407,7 +1436,7 @@
           <a:p>
             <a:fld id="{9D2349FF-49C3-5F4A-AB03-4F06B5BF3E1A}" type="datetimeFigureOut">
               <a:rPr lang="en-US" smtClean="0"/>
-              <a:t>11/25/19</a:t>
+              <a:t>11/25/2019</a:t>
             </a:fld>
             <a:endParaRPr lang="en-US"/>
           </a:p>
@@ -1819,7 +1848,7 @@
           <a:p>
             <a:fld id="{9D2349FF-49C3-5F4A-AB03-4F06B5BF3E1A}" type="datetimeFigureOut">
               <a:rPr lang="en-US" smtClean="0"/>
-              <a:t>11/25/19</a:t>
+              <a:t>11/25/2019</a:t>
             </a:fld>
             <a:endParaRPr lang="en-US"/>
           </a:p>
@@ -1960,7 +1989,7 @@
           <a:p>
             <a:fld id="{9D2349FF-49C3-5F4A-AB03-4F06B5BF3E1A}" type="datetimeFigureOut">
               <a:rPr lang="en-US" smtClean="0"/>
-              <a:t>11/25/19</a:t>
+              <a:t>11/25/2019</a:t>
             </a:fld>
             <a:endParaRPr lang="en-US"/>
           </a:p>
@@ -2073,7 +2102,7 @@
           <a:p>
             <a:fld id="{9D2349FF-49C3-5F4A-AB03-4F06B5BF3E1A}" type="datetimeFigureOut">
               <a:rPr lang="en-US" smtClean="0"/>
-              <a:t>11/25/19</a:t>
+              <a:t>11/25/2019</a:t>
             </a:fld>
             <a:endParaRPr lang="en-US"/>
           </a:p>
@@ -2384,7 +2413,7 @@
           <a:p>
             <a:fld id="{9D2349FF-49C3-5F4A-AB03-4F06B5BF3E1A}" type="datetimeFigureOut">
               <a:rPr lang="en-US" smtClean="0"/>
-              <a:t>11/25/19</a:t>
+              <a:t>11/25/2019</a:t>
             </a:fld>
             <a:endParaRPr lang="en-US"/>
           </a:p>
@@ -2672,7 +2701,7 @@
           <a:p>
             <a:fld id="{9D2349FF-49C3-5F4A-AB03-4F06B5BF3E1A}" type="datetimeFigureOut">
               <a:rPr lang="en-US" smtClean="0"/>
-              <a:t>11/25/19</a:t>
+              <a:t>11/25/2019</a:t>
             </a:fld>
             <a:endParaRPr lang="en-US"/>
           </a:p>
@@ -2913,7 +2942,7 @@
           <a:p>
             <a:fld id="{9D2349FF-49C3-5F4A-AB03-4F06B5BF3E1A}" type="datetimeFigureOut">
               <a:rPr lang="en-US" smtClean="0"/>
-              <a:t>11/25/19</a:t>
+              <a:t>11/25/2019</a:t>
             </a:fld>
             <a:endParaRPr lang="en-US"/>
           </a:p>
@@ -3443,7 +3472,15 @@
           <a:p>
             <a:r>
               <a:rPr lang="en-US" dirty="0"/>
-              <a:t>10-01 - build in streams – 1b</a:t>
+              <a:t>10-01 - build in streams – </a:t>
+            </a:r>
+            <a:r>
+              <a:rPr lang="sk-SK" dirty="0"/>
+              <a:t>5</a:t>
+            </a:r>
+            <a:r>
+              <a:rPr lang="en-US" dirty="0"/>
+              <a:t>b</a:t>
             </a:r>
           </a:p>
         </p:txBody>

</xml_diff>